<commit_message>
Minor tweaks to slides
</commit_message>
<xml_diff>
--- a/BehaviourChainDemo/docs/Slides.pptx
+++ b/BehaviourChainDemo/docs/Slides.pptx
@@ -5,13 +5,14 @@
     <p:sldMasterId id="2147483648" r:id="rId1"/>
   </p:sldMasterIdLst>
   <p:notesMasterIdLst>
-    <p:notesMasterId r:id="rId6"/>
+    <p:notesMasterId r:id="rId7"/>
   </p:notesMasterIdLst>
   <p:sldIdLst>
     <p:sldId id="256" r:id="rId2"/>
     <p:sldId id="258" r:id="rId3"/>
     <p:sldId id="257" r:id="rId4"/>
     <p:sldId id="259" r:id="rId5"/>
+    <p:sldId id="260" r:id="rId6"/>
   </p:sldIdLst>
   <p:sldSz cx="9144000" cy="6858000" type="screen4x3"/>
   <p:notesSz cx="6858000" cy="9144000"/>
@@ -3675,7 +3676,7 @@
           <a:p>
             <a:r>
               <a:rPr lang="en-GB" dirty="0" smtClean="0"/>
-              <a:t>It’s All About Intent</a:t>
+              <a:t>Intentionally Different</a:t>
             </a:r>
             <a:endParaRPr lang="en-GB" dirty="0"/>
           </a:p>
@@ -3719,21 +3720,13 @@
           <a:p>
             <a:r>
               <a:rPr lang="en-GB" sz="2000" dirty="0" smtClean="0"/>
-              <a:t>Behaviour Chains Are Pipelines</a:t>
+              <a:t>Behaviour Chains are pipelines</a:t>
             </a:r>
           </a:p>
           <a:p>
             <a:r>
               <a:rPr lang="en-GB" sz="2000" dirty="0" smtClean="0"/>
-              <a:t>You go from start to end of the pipeline. Each behaviour </a:t>
-            </a:r>
-            <a:r>
-              <a:rPr lang="en-GB" sz="2000" dirty="0" err="1" smtClean="0"/>
-              <a:t>ivoking</a:t>
-            </a:r>
-            <a:r>
-              <a:rPr lang="en-GB" sz="2000" dirty="0" smtClean="0"/>
-              <a:t> itself and controlling the next. </a:t>
+              <a:t>You go from start to end of the pipeline. Each behaviour invoking itself and controlling  invocation of the next. </a:t>
             </a:r>
           </a:p>
           <a:p>
@@ -3957,13 +3950,13 @@
         </p:spPr>
         <p:style>
           <a:lnRef idx="2">
-            <a:schemeClr val="accent3"/>
+            <a:schemeClr val="accent2"/>
           </a:lnRef>
           <a:fillRef idx="0">
-            <a:schemeClr val="accent3"/>
+            <a:schemeClr val="accent2"/>
           </a:fillRef>
           <a:effectRef idx="1">
-            <a:schemeClr val="accent3"/>
+            <a:schemeClr val="accent2"/>
           </a:effectRef>
           <a:fontRef idx="minor">
             <a:schemeClr val="tx1"/>
@@ -4165,6 +4158,39 @@
           </a:p>
         </p:txBody>
       </p:sp>
+      <p:cxnSp>
+        <p:nvCxnSpPr>
+          <p:cNvPr id="22" name="Straight Arrow Connector 21"/>
+          <p:cNvCxnSpPr/>
+          <p:nvPr/>
+        </p:nvCxnSpPr>
+        <p:spPr>
+          <a:xfrm>
+            <a:off x="3635896" y="6093296"/>
+            <a:ext cx="1152128" cy="0"/>
+          </a:xfrm>
+          <a:prstGeom prst="straightConnector1">
+            <a:avLst/>
+          </a:prstGeom>
+          <a:ln>
+            <a:tailEnd type="arrow"/>
+          </a:ln>
+        </p:spPr>
+        <p:style>
+          <a:lnRef idx="2">
+            <a:schemeClr val="accent2"/>
+          </a:lnRef>
+          <a:fillRef idx="0">
+            <a:schemeClr val="accent2"/>
+          </a:fillRef>
+          <a:effectRef idx="1">
+            <a:schemeClr val="accent2"/>
+          </a:effectRef>
+          <a:fontRef idx="minor">
+            <a:schemeClr val="tx1"/>
+          </a:fontRef>
+        </p:style>
+      </p:cxnSp>
     </p:spTree>
   </p:cSld>
   <p:clrMapOvr>
@@ -4599,7 +4625,7 @@
         </p:style>
         <p:txBody>
           <a:bodyPr>
-            <a:normAutofit fontScale="92500"/>
+            <a:normAutofit fontScale="92500" lnSpcReduction="20000"/>
           </a:bodyPr>
           <a:lstStyle/>
           <a:p>
@@ -4611,7 +4637,7 @@
           <a:p>
             <a:r>
               <a:rPr lang="en-GB" sz="2400" dirty="0" smtClean="0"/>
-              <a:t>Separate configuration permits conventions and manipulation</a:t>
+              <a:t>Separate configuration permits conventions and manipulation of chains</a:t>
             </a:r>
             <a:endParaRPr lang="en-GB" sz="2400" dirty="0"/>
           </a:p>
@@ -4739,19 +4765,69 @@
           </a:prstGeom>
         </p:spPr>
         <p:style>
-          <a:lnRef idx="2">
-            <a:schemeClr val="accent1">
-              <a:shade val="50000"/>
-            </a:schemeClr>
+          <a:lnRef idx="1">
+            <a:schemeClr val="accent3"/>
           </a:lnRef>
-          <a:fillRef idx="1">
+          <a:fillRef idx="2">
+            <a:schemeClr val="accent3"/>
+          </a:fillRef>
+          <a:effectRef idx="1">
+            <a:schemeClr val="accent3"/>
+          </a:effectRef>
+          <a:fontRef idx="minor">
+            <a:schemeClr val="dk1"/>
+          </a:fontRef>
+        </p:style>
+        <p:txBody>
+          <a:bodyPr rtlCol="0" anchor="t"/>
+          <a:lstStyle/>
+          <a:p>
+            <a:pPr algn="ctr"/>
+            <a:r>
+              <a:rPr lang="en-GB" dirty="0" smtClean="0"/>
+              <a:t>Behaviour </a:t>
+            </a:r>
+          </a:p>
+          <a:p>
+            <a:r>
+              <a:rPr lang="en-GB" sz="1400" i="1" dirty="0"/>
+              <a:t> </a:t>
+            </a:r>
+            <a:r>
+              <a:rPr lang="en-GB" sz="1400" i="1" dirty="0" smtClean="0"/>
+              <a:t>                     Invoke()</a:t>
+            </a:r>
+            <a:endParaRPr lang="en-GB" sz="1400" i="1" dirty="0"/>
+          </a:p>
+        </p:txBody>
+      </p:sp>
+      <p:sp>
+        <p:nvSpPr>
+          <p:cNvPr id="6" name="Rounded Rectangle 5"/>
+          <p:cNvSpPr/>
+          <p:nvPr/>
+        </p:nvSpPr>
+        <p:spPr>
+          <a:xfrm>
+            <a:off x="1115616" y="4005064"/>
+            <a:ext cx="2160240" cy="1800200"/>
+          </a:xfrm>
+          <a:prstGeom prst="roundRect">
+            <a:avLst/>
+          </a:prstGeom>
+        </p:spPr>
+        <p:style>
+          <a:lnRef idx="1">
+            <a:schemeClr val="accent1"/>
+          </a:lnRef>
+          <a:fillRef idx="2">
             <a:schemeClr val="accent1"/>
           </a:fillRef>
-          <a:effectRef idx="0">
+          <a:effectRef idx="1">
             <a:schemeClr val="accent1"/>
           </a:effectRef>
           <a:fontRef idx="minor">
-            <a:schemeClr val="lt1"/>
+            <a:schemeClr val="dk1"/>
           </a:fontRef>
         </p:style>
         <p:txBody>
@@ -4763,121 +4839,52 @@
               <a:rPr lang="en-GB" dirty="0" smtClean="0"/>
               <a:t>Behaviour </a:t>
             </a:r>
-          </a:p>
-          <a:p>
-            <a:r>
-              <a:rPr lang="en-GB" sz="1400" i="1" dirty="0"/>
-              <a:t> </a:t>
-            </a:r>
-            <a:r>
-              <a:rPr lang="en-GB" sz="1400" i="1" dirty="0" smtClean="0"/>
-              <a:t>                     Invoke()</a:t>
-            </a:r>
-            <a:endParaRPr lang="en-GB" sz="1400" i="1" dirty="0"/>
-          </a:p>
-        </p:txBody>
-      </p:sp>
-      <p:grpSp>
-        <p:nvGrpSpPr>
-          <p:cNvPr id="5" name="Group 4"/>
-          <p:cNvGrpSpPr/>
+            <a:endParaRPr lang="en-GB" dirty="0"/>
+          </a:p>
+        </p:txBody>
+      </p:sp>
+      <p:sp>
+        <p:nvSpPr>
+          <p:cNvPr id="7" name="Rounded Rectangle 6"/>
+          <p:cNvSpPr/>
           <p:nvPr/>
-        </p:nvGrpSpPr>
-        <p:grpSpPr>
+        </p:nvSpPr>
+        <p:spPr>
           <a:xfrm>
-            <a:off x="1115616" y="4005064"/>
-            <a:ext cx="2160240" cy="1800200"/>
-            <a:chOff x="1043608" y="3645024"/>
-            <a:chExt cx="2160240" cy="1800200"/>
-          </a:xfrm>
-        </p:grpSpPr>
-        <p:sp>
-          <p:nvSpPr>
-            <p:cNvPr id="6" name="Rounded Rectangle 5"/>
-            <p:cNvSpPr/>
-            <p:nvPr/>
-          </p:nvSpPr>
-          <p:spPr>
-            <a:xfrm>
-              <a:off x="1043608" y="3645024"/>
-              <a:ext cx="2160240" cy="1800200"/>
-            </a:xfrm>
-            <a:prstGeom prst="roundRect">
-              <a:avLst/>
-            </a:prstGeom>
-          </p:spPr>
-          <p:style>
-            <a:lnRef idx="2">
-              <a:schemeClr val="accent2">
-                <a:shade val="50000"/>
-              </a:schemeClr>
-            </a:lnRef>
-            <a:fillRef idx="1">
-              <a:schemeClr val="accent2"/>
-            </a:fillRef>
-            <a:effectRef idx="0">
-              <a:schemeClr val="accent2"/>
-            </a:effectRef>
-            <a:fontRef idx="minor">
-              <a:schemeClr val="lt1"/>
-            </a:fontRef>
-          </p:style>
-          <p:txBody>
-            <a:bodyPr rtlCol="0" anchor="t"/>
-            <a:lstStyle/>
-            <a:p>
-              <a:pPr algn="ctr"/>
-              <a:r>
-                <a:rPr lang="en-GB" dirty="0" smtClean="0"/>
-                <a:t>Behaviour </a:t>
-              </a:r>
-              <a:endParaRPr lang="en-GB" dirty="0"/>
-            </a:p>
-          </p:txBody>
-        </p:sp>
-        <p:sp>
-          <p:nvSpPr>
-            <p:cNvPr id="7" name="Rounded Rectangle 6"/>
-            <p:cNvSpPr/>
-            <p:nvPr/>
-          </p:nvSpPr>
-          <p:spPr>
-            <a:xfrm>
-              <a:off x="1331640" y="4149080"/>
-              <a:ext cx="1584176" cy="1080120"/>
-            </a:xfrm>
-            <a:prstGeom prst="roundRect">
-              <a:avLst/>
-            </a:prstGeom>
-          </p:spPr>
-          <p:style>
-            <a:lnRef idx="3">
-              <a:schemeClr val="lt1"/>
-            </a:lnRef>
-            <a:fillRef idx="1">
-              <a:schemeClr val="accent3"/>
-            </a:fillRef>
-            <a:effectRef idx="1">
-              <a:schemeClr val="accent3"/>
-            </a:effectRef>
-            <a:fontRef idx="minor">
-              <a:schemeClr val="lt1"/>
-            </a:fontRef>
-          </p:style>
-          <p:txBody>
-            <a:bodyPr rtlCol="0" anchor="ctr"/>
-            <a:lstStyle/>
-            <a:p>
-              <a:pPr algn="ctr"/>
-              <a:r>
-                <a:rPr lang="en-GB" dirty="0" smtClean="0"/>
-                <a:t>Behaviour</a:t>
-              </a:r>
-              <a:endParaRPr lang="en-GB" dirty="0"/>
-            </a:p>
-          </p:txBody>
-        </p:sp>
-      </p:grpSp>
+            <a:off x="1403648" y="4509120"/>
+            <a:ext cx="1584176" cy="1080120"/>
+          </a:xfrm>
+          <a:prstGeom prst="roundRect">
+            <a:avLst/>
+          </a:prstGeom>
+        </p:spPr>
+        <p:style>
+          <a:lnRef idx="1">
+            <a:schemeClr val="accent4"/>
+          </a:lnRef>
+          <a:fillRef idx="2">
+            <a:schemeClr val="accent4"/>
+          </a:fillRef>
+          <a:effectRef idx="1">
+            <a:schemeClr val="accent4"/>
+          </a:effectRef>
+          <a:fontRef idx="minor">
+            <a:schemeClr val="dk1"/>
+          </a:fontRef>
+        </p:style>
+        <p:txBody>
+          <a:bodyPr rtlCol="0" anchor="ctr"/>
+          <a:lstStyle/>
+          <a:p>
+            <a:pPr algn="ctr"/>
+            <a:r>
+              <a:rPr lang="en-GB" dirty="0" smtClean="0"/>
+              <a:t>Behaviour</a:t>
+            </a:r>
+            <a:endParaRPr lang="en-GB" dirty="0"/>
+          </a:p>
+        </p:txBody>
+      </p:sp>
       <p:sp>
         <p:nvSpPr>
           <p:cNvPr id="8" name="Rectangle 7"/>
@@ -4998,6 +5005,114 @@
               <a:rPr lang="en-GB" dirty="0"/>
               <a:t>}</a:t>
             </a:r>
+          </a:p>
+        </p:txBody>
+      </p:sp>
+    </p:spTree>
+  </p:cSld>
+  <p:clrMapOvr>
+    <a:masterClrMapping/>
+  </p:clrMapOvr>
+</p:sld>
+</file>
+
+<file path=ppt/slides/slide5.xml><?xml version="1.0" encoding="utf-8"?>
+<p:sld xmlns:a="http://schemas.openxmlformats.org/drawingml/2006/main" xmlns:r="http://schemas.openxmlformats.org/officeDocument/2006/relationships" xmlns:p="http://schemas.openxmlformats.org/presentationml/2006/main">
+  <p:cSld>
+    <p:spTree>
+      <p:nvGrpSpPr>
+        <p:cNvPr id="1" name=""/>
+        <p:cNvGrpSpPr/>
+        <p:nvPr/>
+      </p:nvGrpSpPr>
+      <p:grpSpPr>
+        <a:xfrm>
+          <a:off x="0" y="0"/>
+          <a:ext cx="0" cy="0"/>
+          <a:chOff x="0" y="0"/>
+          <a:chExt cx="0" cy="0"/>
+        </a:xfrm>
+      </p:grpSpPr>
+      <p:sp>
+        <p:nvSpPr>
+          <p:cNvPr id="2" name="Title 1"/>
+          <p:cNvSpPr>
+            <a:spLocks noGrp="1"/>
+          </p:cNvSpPr>
+          <p:nvPr>
+            <p:ph type="title"/>
+          </p:nvPr>
+        </p:nvSpPr>
+        <p:spPr/>
+        <p:txBody>
+          <a:bodyPr/>
+          <a:lstStyle/>
+          <a:p>
+            <a:r>
+              <a:rPr lang="en-GB" dirty="0" smtClean="0"/>
+              <a:t>Links</a:t>
+            </a:r>
+            <a:endParaRPr lang="en-GB" dirty="0"/>
+          </a:p>
+        </p:txBody>
+      </p:sp>
+      <p:sp>
+        <p:nvSpPr>
+          <p:cNvPr id="3" name="Content Placeholder 2"/>
+          <p:cNvSpPr>
+            <a:spLocks noGrp="1"/>
+          </p:cNvSpPr>
+          <p:nvPr>
+            <p:ph idx="1"/>
+          </p:nvPr>
+        </p:nvSpPr>
+        <p:spPr/>
+        <p:txBody>
+          <a:bodyPr/>
+          <a:lstStyle/>
+          <a:p>
+            <a:pPr lvl="0"/>
+            <a:r>
+              <a:rPr lang="en-GB" u="sng" dirty="0" smtClean="0">
+                <a:hlinkClick r:id="rId2"/>
+              </a:rPr>
+              <a:t>http</a:t>
+            </a:r>
+            <a:r>
+              <a:rPr lang="en-GB" u="sng" dirty="0">
+                <a:hlinkClick r:id="rId2"/>
+              </a:rPr>
+              <a:t>://</a:t>
+            </a:r>
+            <a:r>
+              <a:rPr lang="en-GB" u="sng" dirty="0" smtClean="0">
+                <a:hlinkClick r:id="rId2"/>
+              </a:rPr>
+              <a:t>lostechies.com/chadmyers/2011/06/23/cool-stuff-in-fubumvc-no-1-behaviors</a:t>
+            </a:r>
+            <a:endParaRPr lang="en-GB" u="sng" dirty="0" smtClean="0"/>
+          </a:p>
+          <a:p>
+            <a:pPr lvl="0">
+              <a:buNone/>
+            </a:pPr>
+            <a:endParaRPr lang="en-GB" dirty="0"/>
+          </a:p>
+          <a:p>
+            <a:pPr lvl="0"/>
+            <a:r>
+              <a:rPr lang="en-GB" u="sng" dirty="0">
+                <a:hlinkClick r:id="rId3"/>
+              </a:rPr>
+              <a:t>http://lostechies.com/josharnold/2011/02/01/fubumvc-primer-configuration-vs-runtime/</a:t>
+            </a:r>
+            <a:endParaRPr lang="en-GB" dirty="0"/>
+          </a:p>
+          <a:p>
+            <a:pPr>
+              <a:buNone/>
+            </a:pPr>
+            <a:endParaRPr lang="en-GB" dirty="0"/>
           </a:p>
         </p:txBody>
       </p:sp>

</xml_diff>